<commit_message>
update with qr code and adjsut some alignment
</commit_message>
<xml_diff>
--- a/source/CHUFEIWU_Resume.pptx
+++ b/source/CHUFEIWU_Resume.pptx
@@ -298,7 +298,7 @@
           <a:p>
             <a:fld id="{3F8670AC-4648-4758-83B2-2E257262446E}" type="datetimeFigureOut">
               <a:rPr lang="zh-TW" altLang="en-US" smtClean="0"/>
-              <a:t>2024/11/12</a:t>
+              <a:t>2025/3/15</a:t>
             </a:fld>
             <a:endParaRPr lang="zh-TW" altLang="en-US"/>
           </a:p>
@@ -794,7 +794,7 @@
           <a:p>
             <a:fld id="{1D8BD707-D9CF-40AE-B4C6-C98DA3205C09}" type="datetimeFigureOut">
               <a:rPr lang="en-US"/>
-              <a:t>11/12/2024</a:t>
+              <a:t>3/15/2025</a:t>
             </a:fld>
             <a:endParaRPr lang="en-US"/>
           </a:p>
@@ -965,7 +965,7 @@
           <a:p>
             <a:fld id="{1D8BD707-D9CF-40AE-B4C6-C98DA3205C09}" type="datetimeFigureOut">
               <a:rPr lang="en-US"/>
-              <a:t>11/12/2024</a:t>
+              <a:t>3/15/2025</a:t>
             </a:fld>
             <a:endParaRPr lang="en-US"/>
           </a:p>
@@ -1179,7 +1179,7 @@
           <a:p>
             <a:fld id="{1D8BD707-D9CF-40AE-B4C6-C98DA3205C09}" type="datetimeFigureOut">
               <a:rPr lang="en-US"/>
-              <a:t>11/12/2024</a:t>
+              <a:t>3/15/2025</a:t>
             </a:fld>
             <a:endParaRPr lang="en-US"/>
           </a:p>
@@ -1327,7 +1327,7 @@
           <a:p>
             <a:fld id="{1D8BD707-D9CF-40AE-B4C6-C98DA3205C09}" type="datetimeFigureOut">
               <a:rPr lang="en-US"/>
-              <a:t>11/12/2024</a:t>
+              <a:t>3/15/2025</a:t>
             </a:fld>
             <a:endParaRPr lang="en-US"/>
           </a:p>
@@ -1446,7 +1446,7 @@
           <a:p>
             <a:fld id="{1D8BD707-D9CF-40AE-B4C6-C98DA3205C09}" type="datetimeFigureOut">
               <a:rPr lang="en-US"/>
-              <a:t>11/12/2024</a:t>
+              <a:t>3/15/2025</a:t>
             </a:fld>
             <a:endParaRPr lang="en-US"/>
           </a:p>
@@ -1665,7 +1665,7 @@
           <a:p>
             <a:fld id="{1D8BD707-D9CF-40AE-B4C6-C98DA3205C09}" type="datetimeFigureOut">
               <a:rPr lang="en-US"/>
-              <a:t>11/12/2024</a:t>
+              <a:t>3/15/2025</a:t>
             </a:fld>
             <a:endParaRPr lang="en-US"/>
           </a:p>
@@ -2037,7 +2037,7 @@
               </a:rPr>
               <a:t>CE DEVELOPER</a:t>
             </a:r>
-            <a:endParaRPr sz="750" dirty="0">
+            <a:endParaRPr lang="en-US" sz="750" dirty="0">
               <a:latin typeface="Tarsus" panose="02000000000000000000" pitchFamily="50" charset="0"/>
               <a:cs typeface="Tahoma"/>
             </a:endParaRPr>
@@ -2052,17 +2052,17 @@
               </a:spcBef>
             </a:pPr>
             <a:r>
-              <a:rPr sz="650" dirty="0">
+              <a:rPr lang="en-US" sz="650" dirty="0">
                 <a:solidFill>
                   <a:srgbClr val="333333"/>
                 </a:solidFill>
                 <a:latin typeface="Tarsus" panose="02000000000000000000" pitchFamily="50" charset="0"/>
                 <a:cs typeface="Gill Sans MT"/>
               </a:rPr>
-              <a:t>df@dfder.tw</a:t>
-            </a:r>
-            <a:r>
-              <a:rPr sz="650" spc="340" dirty="0">
+              <a:t>  df@dfder.tw</a:t>
+            </a:r>
+            <a:r>
+              <a:rPr lang="en-US" sz="650" spc="340" dirty="0">
                 <a:solidFill>
                   <a:srgbClr val="333333"/>
                 </a:solidFill>
@@ -2072,176 +2072,176 @@
               <a:t> </a:t>
             </a:r>
             <a:r>
-              <a:rPr sz="650" dirty="0">
+              <a:rPr lang="en-US" sz="650" dirty="0">
                 <a:solidFill>
                   <a:srgbClr val="333333"/>
                 </a:solidFill>
                 <a:latin typeface="Tarsus" panose="02000000000000000000" pitchFamily="50" charset="0"/>
                 <a:cs typeface="Gill Sans MT"/>
               </a:rPr>
+              <a:t>| </a:t>
+            </a:r>
+            <a:r>
+              <a:rPr lang="en-US" sz="650" spc="340" dirty="0">
+                <a:solidFill>
+                  <a:srgbClr val="333333"/>
+                </a:solidFill>
+                <a:latin typeface="Tarsus" panose="02000000000000000000" pitchFamily="50" charset="0"/>
+                <a:cs typeface="Gill Sans MT"/>
+              </a:rPr>
+              <a:t> </a:t>
+            </a:r>
+            <a:r>
+              <a:rPr lang="en-US" altLang="zh-TW" sz="650" spc="340" dirty="0">
+                <a:solidFill>
+                  <a:srgbClr val="333333"/>
+                </a:solidFill>
+                <a:latin typeface="Tarsus" panose="02000000000000000000" pitchFamily="50" charset="0"/>
+                <a:cs typeface="Gill Sans MT"/>
+              </a:rPr>
+              <a:t> </a:t>
+            </a:r>
+            <a:r>
+              <a:rPr lang="en-US" sz="650" spc="340" dirty="0">
+                <a:solidFill>
+                  <a:srgbClr val="333333"/>
+                </a:solidFill>
+                <a:latin typeface="Tarsus" panose="02000000000000000000" pitchFamily="50" charset="0"/>
+                <a:cs typeface="Gill Sans MT"/>
+              </a:rPr>
+              <a:t> </a:t>
+            </a:r>
+            <a:r>
+              <a:rPr lang="en-US" altLang="zh-TW" sz="650" spc="-80" dirty="0">
+                <a:solidFill>
+                  <a:srgbClr val="333333"/>
+                </a:solidFill>
+                <a:latin typeface="Tarsus" panose="02000000000000000000" pitchFamily="50" charset="0"/>
+                <a:cs typeface="Gill Sans MT"/>
+              </a:rPr>
+              <a:t> </a:t>
+            </a:r>
+            <a:r>
+              <a:rPr lang="en-US" sz="650" dirty="0">
+                <a:solidFill>
+                  <a:srgbClr val="333333"/>
+                </a:solidFill>
+                <a:latin typeface="Tarsus" panose="02000000000000000000" pitchFamily="50" charset="0"/>
+                <a:cs typeface="Gill Sans MT"/>
+              </a:rPr>
+              <a:t>DF-</a:t>
+            </a:r>
+            <a:r>
+              <a:rPr lang="en-US" sz="650" dirty="0" err="1">
+                <a:solidFill>
+                  <a:srgbClr val="333333"/>
+                </a:solidFill>
+                <a:latin typeface="Tarsus" panose="02000000000000000000" pitchFamily="50" charset="0"/>
+                <a:cs typeface="Gill Sans MT"/>
+              </a:rPr>
+              <a:t>wu</a:t>
+            </a:r>
+            <a:r>
+              <a:rPr lang="en-US" sz="650" spc="335" dirty="0">
+                <a:solidFill>
+                  <a:srgbClr val="333333"/>
+                </a:solidFill>
+                <a:latin typeface="Tarsus" panose="02000000000000000000" pitchFamily="50" charset="0"/>
+                <a:cs typeface="Gill Sans MT"/>
+              </a:rPr>
+              <a:t> </a:t>
+            </a:r>
+            <a:r>
+              <a:rPr lang="en-US" sz="650" dirty="0">
+                <a:solidFill>
+                  <a:srgbClr val="333333"/>
+                </a:solidFill>
+                <a:latin typeface="Tarsus" panose="02000000000000000000" pitchFamily="50" charset="0"/>
+                <a:cs typeface="Gill Sans MT"/>
+              </a:rPr>
               <a:t>|</a:t>
             </a:r>
             <a:r>
-              <a:rPr sz="650" spc="340" dirty="0">
+              <a:rPr lang="en-US" altLang="zh-TW" sz="650" dirty="0">
                 <a:solidFill>
                   <a:srgbClr val="333333"/>
                 </a:solidFill>
                 <a:latin typeface="Tarsus" panose="02000000000000000000" pitchFamily="50" charset="0"/>
                 <a:cs typeface="Gill Sans MT"/>
               </a:rPr>
+              <a:t>    </a:t>
+            </a:r>
+            <a:r>
+              <a:rPr lang="en-US" sz="650" spc="340" dirty="0">
+                <a:solidFill>
+                  <a:srgbClr val="333333"/>
+                </a:solidFill>
+                <a:latin typeface="Tarsus" panose="02000000000000000000" pitchFamily="50" charset="0"/>
+                <a:cs typeface="Gill Sans MT"/>
+              </a:rPr>
               <a:t> </a:t>
             </a:r>
             <a:r>
-              <a:rPr lang="en-US" altLang="zh-TW" sz="650" spc="340" dirty="0">
+              <a:rPr lang="en-US" sz="650" spc="90" dirty="0">
+                <a:solidFill>
+                  <a:srgbClr val="333333"/>
+                </a:solidFill>
+                <a:latin typeface="Tarsus" panose="02000000000000000000" pitchFamily="50" charset="0"/>
+                <a:cs typeface="新細明體"/>
+              </a:rPr>
+              <a:t> </a:t>
+            </a:r>
+            <a:r>
+              <a:rPr lang="en-US" altLang="zh-TW" sz="650" spc="90" dirty="0">
+                <a:solidFill>
+                  <a:srgbClr val="333333"/>
+                </a:solidFill>
+                <a:latin typeface="Tarsus" panose="02000000000000000000" pitchFamily="50" charset="0"/>
+                <a:cs typeface="新細明體"/>
+              </a:rPr>
+              <a:t> </a:t>
+            </a:r>
+            <a:r>
+              <a:rPr lang="en-US" sz="650" dirty="0">
                 <a:solidFill>
                   <a:srgbClr val="333333"/>
                 </a:solidFill>
                 <a:latin typeface="Tarsus" panose="02000000000000000000" pitchFamily="50" charset="0"/>
                 <a:cs typeface="Gill Sans MT"/>
               </a:rPr>
-              <a:t> </a:t>
-            </a:r>
-            <a:r>
-              <a:rPr sz="650" spc="340" dirty="0">
+              <a:t>www.linkedin.com/in/chufei-</a:t>
+            </a:r>
+            <a:r>
+              <a:rPr lang="en-US" sz="650" spc="60" dirty="0">
                 <a:solidFill>
                   <a:srgbClr val="333333"/>
                 </a:solidFill>
                 <a:latin typeface="Tarsus" panose="02000000000000000000" pitchFamily="50" charset="0"/>
                 <a:cs typeface="Gill Sans MT"/>
               </a:rPr>
-              <a:t> </a:t>
-            </a:r>
-            <a:r>
-              <a:rPr lang="en-US" altLang="zh-TW" sz="650" spc="-80" dirty="0">
+              <a:t>wu-</a:t>
+            </a:r>
+            <a:r>
+              <a:rPr lang="en-US" sz="650" spc="55" dirty="0">
                 <a:solidFill>
                   <a:srgbClr val="333333"/>
                 </a:solidFill>
                 <a:latin typeface="Tarsus" panose="02000000000000000000" pitchFamily="50" charset="0"/>
                 <a:cs typeface="Gill Sans MT"/>
               </a:rPr>
-              <a:t> </a:t>
-            </a:r>
-            <a:r>
-              <a:rPr sz="650" dirty="0">
+              <a:t>b33990164/</a:t>
+            </a:r>
+            <a:r>
+              <a:rPr lang="en-US" sz="650" spc="340" dirty="0">
                 <a:solidFill>
                   <a:srgbClr val="333333"/>
                 </a:solidFill>
                 <a:latin typeface="Tarsus" panose="02000000000000000000" pitchFamily="50" charset="0"/>
                 <a:cs typeface="Gill Sans MT"/>
               </a:rPr>
-              <a:t>DF-</a:t>
-            </a:r>
-            <a:r>
-              <a:rPr sz="650" dirty="0" err="1">
-                <a:solidFill>
-                  <a:srgbClr val="333333"/>
-                </a:solidFill>
-                <a:latin typeface="Tarsus" panose="02000000000000000000" pitchFamily="50" charset="0"/>
-                <a:cs typeface="Gill Sans MT"/>
-              </a:rPr>
-              <a:t>wu</a:t>
-            </a:r>
-            <a:r>
-              <a:rPr sz="650" spc="335" dirty="0">
-                <a:solidFill>
-                  <a:srgbClr val="333333"/>
-                </a:solidFill>
-                <a:latin typeface="Tarsus" panose="02000000000000000000" pitchFamily="50" charset="0"/>
-                <a:cs typeface="Gill Sans MT"/>
-              </a:rPr>
-              <a:t> </a:t>
-            </a:r>
-            <a:r>
-              <a:rPr sz="650" dirty="0">
-                <a:solidFill>
-                  <a:srgbClr val="333333"/>
-                </a:solidFill>
-                <a:latin typeface="Tarsus" panose="02000000000000000000" pitchFamily="50" charset="0"/>
-                <a:cs typeface="Gill Sans MT"/>
-              </a:rPr>
-              <a:t>|</a:t>
-            </a:r>
-            <a:r>
-              <a:rPr lang="en-US" altLang="zh-TW" sz="650" dirty="0">
-                <a:solidFill>
-                  <a:srgbClr val="333333"/>
-                </a:solidFill>
-                <a:latin typeface="Tarsus" panose="02000000000000000000" pitchFamily="50" charset="0"/>
-                <a:cs typeface="Gill Sans MT"/>
-              </a:rPr>
-              <a:t>    </a:t>
-            </a:r>
-            <a:r>
-              <a:rPr sz="650" spc="340" dirty="0">
-                <a:solidFill>
-                  <a:srgbClr val="333333"/>
-                </a:solidFill>
-                <a:latin typeface="Tarsus" panose="02000000000000000000" pitchFamily="50" charset="0"/>
-                <a:cs typeface="Gill Sans MT"/>
-              </a:rPr>
-              <a:t> </a:t>
-            </a:r>
-            <a:r>
-              <a:rPr sz="650" spc="90" dirty="0">
-                <a:solidFill>
-                  <a:srgbClr val="333333"/>
-                </a:solidFill>
-                <a:latin typeface="Tarsus" panose="02000000000000000000" pitchFamily="50" charset="0"/>
-                <a:cs typeface="新細明體"/>
-              </a:rPr>
-              <a:t> </a:t>
-            </a:r>
-            <a:r>
-              <a:rPr lang="en-US" altLang="zh-TW" sz="650" spc="90" dirty="0">
-                <a:solidFill>
-                  <a:srgbClr val="333333"/>
-                </a:solidFill>
-                <a:latin typeface="Tarsus" panose="02000000000000000000" pitchFamily="50" charset="0"/>
-                <a:cs typeface="新細明體"/>
-              </a:rPr>
-              <a:t> </a:t>
-            </a:r>
-            <a:r>
-              <a:rPr sz="650" dirty="0">
-                <a:solidFill>
-                  <a:srgbClr val="333333"/>
-                </a:solidFill>
-                <a:latin typeface="Tarsus" panose="02000000000000000000" pitchFamily="50" charset="0"/>
-                <a:cs typeface="Gill Sans MT"/>
-              </a:rPr>
-              <a:t>www.linkedin.com/in/chufei-</a:t>
-            </a:r>
-            <a:r>
-              <a:rPr sz="650" spc="60" dirty="0">
-                <a:solidFill>
-                  <a:srgbClr val="333333"/>
-                </a:solidFill>
-                <a:latin typeface="Tarsus" panose="02000000000000000000" pitchFamily="50" charset="0"/>
-                <a:cs typeface="Gill Sans MT"/>
-              </a:rPr>
-              <a:t>wu-</a:t>
-            </a:r>
-            <a:r>
-              <a:rPr sz="650" spc="55" dirty="0">
-                <a:solidFill>
-                  <a:srgbClr val="333333"/>
-                </a:solidFill>
-                <a:latin typeface="Tarsus" panose="02000000000000000000" pitchFamily="50" charset="0"/>
-                <a:cs typeface="Gill Sans MT"/>
-              </a:rPr>
-              <a:t>b33990164/</a:t>
-            </a:r>
-            <a:r>
-              <a:rPr sz="650" spc="340" dirty="0">
-                <a:solidFill>
-                  <a:srgbClr val="333333"/>
-                </a:solidFill>
-                <a:latin typeface="Tarsus" panose="02000000000000000000" pitchFamily="50" charset="0"/>
-                <a:cs typeface="Gill Sans MT"/>
-              </a:rPr>
               <a:t>  </a:t>
             </a:r>
-            <a:endParaRPr sz="650" dirty="0">
+            <a:endParaRPr lang="en-US" sz="650" dirty="0">
               <a:latin typeface="Tarsus" panose="02000000000000000000" pitchFamily="50" charset="0"/>
               <a:cs typeface="Gill Sans MT"/>
             </a:endParaRPr>
@@ -4752,7 +4752,7 @@
                 <a:latin typeface="Helvetica" pitchFamily="2" charset="0"/>
                 <a:cs typeface="Tahoma"/>
               </a:rPr>
-              <a:t>July</a:t>
+              <a:t>March</a:t>
             </a:r>
             <a:r>
               <a:rPr sz="800" dirty="0">
@@ -4772,7 +4772,7 @@
                 <a:latin typeface="Helvetica" pitchFamily="2" charset="0"/>
                 <a:cs typeface="Tahoma"/>
               </a:rPr>
-              <a:t>11</a:t>
+              <a:t>15</a:t>
             </a:r>
             <a:r>
               <a:rPr sz="800" dirty="0">
@@ -4792,7 +4792,7 @@
                 <a:latin typeface="Helvetica" pitchFamily="2" charset="0"/>
                 <a:cs typeface="Tahoma"/>
               </a:rPr>
-              <a:t>4</a:t>
+              <a:t>5</a:t>
             </a:r>
             <a:r>
               <a:rPr sz="800" dirty="0">
@@ -4822,7 +4822,17 @@
                 <a:latin typeface="Helvetica" pitchFamily="2" charset="0"/>
                 <a:cs typeface="Tahoma"/>
               </a:rPr>
-              <a:t> WU · RÉSUMÉ	</a:t>
+              <a:t> WU · RÉSUMÉ</a:t>
+            </a:r>
+            <a:r>
+              <a:rPr lang="zh-TW" altLang="en-US" sz="800" dirty="0">
+                <a:solidFill>
+                  <a:srgbClr val="999999"/>
+                </a:solidFill>
+                <a:latin typeface="Helvetica" pitchFamily="2" charset="0"/>
+                <a:cs typeface="Tahoma"/>
+              </a:rPr>
+              <a:t>	</a:t>
             </a:r>
             <a:endParaRPr sz="800" dirty="0">
               <a:latin typeface="Helvetica" pitchFamily="2" charset="0"/>
@@ -4860,7 +4870,7 @@
         </p:blipFill>
         <p:spPr bwMode="auto">
           <a:xfrm>
-            <a:off x="2574576" y="691681"/>
+            <a:off x="2612594" y="691041"/>
             <a:ext cx="171425" cy="171425"/>
           </a:xfrm>
           <a:prstGeom prst="rect">
@@ -4900,7 +4910,7 @@
         </p:blipFill>
         <p:spPr>
           <a:xfrm>
-            <a:off x="3189258" y="720601"/>
+            <a:off x="3217041" y="720601"/>
             <a:ext cx="107686" cy="107686"/>
           </a:xfrm>
           <a:prstGeom prst="rect">
@@ -4930,7 +4940,7 @@
         </p:blipFill>
         <p:spPr>
           <a:xfrm>
-            <a:off x="1846025" y="720601"/>
+            <a:off x="1873250" y="721266"/>
             <a:ext cx="131677" cy="131677"/>
           </a:xfrm>
           <a:prstGeom prst="rect">
@@ -7020,6 +7030,91 @@
             <a:endParaRPr lang="en-US" sz="800" dirty="0">
               <a:latin typeface="Tarsus Light" panose="02000000000000000000" pitchFamily="50" charset="0"/>
               <a:cs typeface="Cambria"/>
+            </a:endParaRPr>
+          </a:p>
+        </p:txBody>
+      </p:sp>
+      <p:pic>
+        <p:nvPicPr>
+          <p:cNvPr id="59" name="圖片 58">
+            <a:extLst>
+              <a:ext uri="{FF2B5EF4-FFF2-40B4-BE49-F238E27FC236}">
+                <a16:creationId xmlns:a16="http://schemas.microsoft.com/office/drawing/2014/main" id="{82E09554-7D1A-5B98-B45F-5E9DEEC31449}"/>
+              </a:ext>
+            </a:extLst>
+          </p:cNvPr>
+          <p:cNvPicPr>
+            <a:picLocks noChangeAspect="1"/>
+          </p:cNvPicPr>
+          <p:nvPr/>
+        </p:nvPicPr>
+        <p:blipFill>
+          <a:blip r:embed="rId6"/>
+          <a:stretch>
+            <a:fillRect/>
+          </a:stretch>
+        </p:blipFill>
+        <p:spPr>
+          <a:xfrm>
+            <a:off x="6787121" y="293672"/>
+            <a:ext cx="554498" cy="554498"/>
+          </a:xfrm>
+          <a:prstGeom prst="rect">
+            <a:avLst/>
+          </a:prstGeom>
+        </p:spPr>
+      </p:pic>
+      <p:sp>
+        <p:nvSpPr>
+          <p:cNvPr id="62" name="文字方塊 61">
+            <a:extLst>
+              <a:ext uri="{FF2B5EF4-FFF2-40B4-BE49-F238E27FC236}">
+                <a16:creationId xmlns:a16="http://schemas.microsoft.com/office/drawing/2014/main" id="{D9C5CD5F-10FF-450A-950B-AAE2D9A2E93F}"/>
+              </a:ext>
+            </a:extLst>
+          </p:cNvPr>
+          <p:cNvSpPr txBox="1"/>
+          <p:nvPr/>
+        </p:nvSpPr>
+        <p:spPr>
+          <a:xfrm>
+            <a:off x="6717848" y="784758"/>
+            <a:ext cx="718420" cy="215444"/>
+          </a:xfrm>
+          <a:prstGeom prst="rect">
+            <a:avLst/>
+          </a:prstGeom>
+          <a:noFill/>
+        </p:spPr>
+        <p:txBody>
+          <a:bodyPr wrap="square" rtlCol="0">
+            <a:spAutoFit/>
+          </a:bodyPr>
+          <a:lstStyle/>
+          <a:p>
+            <a:r>
+              <a:rPr lang="en-US" altLang="zh-TW" sz="800" dirty="0">
+                <a:solidFill>
+                  <a:srgbClr val="333333"/>
+                </a:solidFill>
+                <a:latin typeface="Tarsus" panose="02000000000000000000" pitchFamily="50" charset="0"/>
+              </a:rPr>
+              <a:t>df.is-</a:t>
+            </a:r>
+            <a:r>
+              <a:rPr lang="en-US" altLang="zh-TW" sz="800" dirty="0" err="1">
+                <a:solidFill>
+                  <a:srgbClr val="333333"/>
+                </a:solidFill>
+                <a:latin typeface="Tarsus" panose="02000000000000000000" pitchFamily="50" charset="0"/>
+              </a:rPr>
+              <a:t>a.dev</a:t>
+            </a:r>
+            <a:endParaRPr lang="zh-TW" altLang="en-US" sz="800" dirty="0">
+              <a:solidFill>
+                <a:srgbClr val="333333"/>
+              </a:solidFill>
+              <a:latin typeface="Tarsus" panose="02000000000000000000" pitchFamily="50" charset="0"/>
             </a:endParaRPr>
           </a:p>
         </p:txBody>

</xml_diff>

<commit_message>
adjust the sub title style
</commit_message>
<xml_diff>
--- a/source/CHUFEIWU_Resume.pptx
+++ b/source/CHUFEIWU_Resume.pptx
@@ -298,7 +298,7 @@
           <a:p>
             <a:fld id="{3F8670AC-4648-4758-83B2-2E257262446E}" type="datetimeFigureOut">
               <a:rPr lang="zh-TW" altLang="en-US" smtClean="0"/>
-              <a:t>2025/3/15</a:t>
+              <a:t>2025/3/16</a:t>
             </a:fld>
             <a:endParaRPr lang="zh-TW" altLang="en-US"/>
           </a:p>
@@ -794,7 +794,7 @@
           <a:p>
             <a:fld id="{1D8BD707-D9CF-40AE-B4C6-C98DA3205C09}" type="datetimeFigureOut">
               <a:rPr lang="en-US"/>
-              <a:t>3/15/2025</a:t>
+              <a:t>3/16/2025</a:t>
             </a:fld>
             <a:endParaRPr lang="en-US"/>
           </a:p>
@@ -965,7 +965,7 @@
           <a:p>
             <a:fld id="{1D8BD707-D9CF-40AE-B4C6-C98DA3205C09}" type="datetimeFigureOut">
               <a:rPr lang="en-US"/>
-              <a:t>3/15/2025</a:t>
+              <a:t>3/16/2025</a:t>
             </a:fld>
             <a:endParaRPr lang="en-US"/>
           </a:p>
@@ -1179,7 +1179,7 @@
           <a:p>
             <a:fld id="{1D8BD707-D9CF-40AE-B4C6-C98DA3205C09}" type="datetimeFigureOut">
               <a:rPr lang="en-US"/>
-              <a:t>3/15/2025</a:t>
+              <a:t>3/16/2025</a:t>
             </a:fld>
             <a:endParaRPr lang="en-US"/>
           </a:p>
@@ -1327,7 +1327,7 @@
           <a:p>
             <a:fld id="{1D8BD707-D9CF-40AE-B4C6-C98DA3205C09}" type="datetimeFigureOut">
               <a:rPr lang="en-US"/>
-              <a:t>3/15/2025</a:t>
+              <a:t>3/16/2025</a:t>
             </a:fld>
             <a:endParaRPr lang="en-US"/>
           </a:p>
@@ -1446,7 +1446,7 @@
           <a:p>
             <a:fld id="{1D8BD707-D9CF-40AE-B4C6-C98DA3205C09}" type="datetimeFigureOut">
               <a:rPr lang="en-US"/>
-              <a:t>3/15/2025</a:t>
+              <a:t>3/16/2025</a:t>
             </a:fld>
             <a:endParaRPr lang="en-US"/>
           </a:p>
@@ -1665,7 +1665,7 @@
           <a:p>
             <a:fld id="{1D8BD707-D9CF-40AE-B4C6-C98DA3205C09}" type="datetimeFigureOut">
               <a:rPr lang="en-US"/>
-              <a:t>3/15/2025</a:t>
+              <a:t>3/16/2025</a:t>
             </a:fld>
             <a:endParaRPr lang="en-US"/>
           </a:p>
@@ -2059,7 +2059,7 @@
                 <a:latin typeface="Tarsus" panose="02000000000000000000" pitchFamily="50" charset="0"/>
                 <a:cs typeface="Gill Sans MT"/>
               </a:rPr>
-              <a:t>  df@dfder.tw</a:t>
+              <a:t>        df@dfder.tw | </a:t>
             </a:r>
             <a:r>
               <a:rPr lang="en-US" sz="650" spc="340" dirty="0">
@@ -2072,6 +2072,36 @@
               <a:t> </a:t>
             </a:r>
             <a:r>
+              <a:rPr lang="en-US" altLang="zh-TW" sz="650" spc="340" dirty="0">
+                <a:solidFill>
+                  <a:srgbClr val="333333"/>
+                </a:solidFill>
+                <a:latin typeface="Tarsus" panose="02000000000000000000" pitchFamily="50" charset="0"/>
+                <a:cs typeface="Gill Sans MT"/>
+              </a:rPr>
+              <a:t> </a:t>
+            </a:r>
+            <a:r>
+              <a:rPr lang="en-US" sz="650" spc="340" dirty="0">
+                <a:solidFill>
+                  <a:srgbClr val="333333"/>
+                </a:solidFill>
+                <a:latin typeface="Tarsus" panose="02000000000000000000" pitchFamily="50" charset="0"/>
+                <a:cs typeface="Gill Sans MT"/>
+              </a:rPr>
+              <a:t> </a:t>
+            </a:r>
+            <a:r>
+              <a:rPr lang="en-US" altLang="zh-TW" sz="650" spc="-80" dirty="0">
+                <a:solidFill>
+                  <a:srgbClr val="333333"/>
+                </a:solidFill>
+                <a:latin typeface="Tarsus" panose="02000000000000000000" pitchFamily="50" charset="0"/>
+                <a:cs typeface="Gill Sans MT"/>
+              </a:rPr>
+              <a:t> </a:t>
+            </a:r>
+            <a:r>
               <a:rPr lang="en-US" sz="650" dirty="0">
                 <a:solidFill>
                   <a:srgbClr val="333333"/>
@@ -2079,7 +2109,47 @@
                 <a:latin typeface="Tarsus" panose="02000000000000000000" pitchFamily="50" charset="0"/>
                 <a:cs typeface="Gill Sans MT"/>
               </a:rPr>
-              <a:t>| </a:t>
+              <a:t>DF-</a:t>
+            </a:r>
+            <a:r>
+              <a:rPr lang="en-US" sz="650" dirty="0" err="1">
+                <a:solidFill>
+                  <a:srgbClr val="333333"/>
+                </a:solidFill>
+                <a:latin typeface="Tarsus" panose="02000000000000000000" pitchFamily="50" charset="0"/>
+                <a:cs typeface="Gill Sans MT"/>
+              </a:rPr>
+              <a:t>wu</a:t>
+            </a:r>
+            <a:r>
+              <a:rPr lang="en-US" sz="650" spc="335" dirty="0">
+                <a:solidFill>
+                  <a:srgbClr val="333333"/>
+                </a:solidFill>
+                <a:latin typeface="Tarsus" panose="02000000000000000000" pitchFamily="50" charset="0"/>
+                <a:cs typeface="Gill Sans MT"/>
+              </a:rPr>
+              <a:t> </a:t>
+            </a:r>
+            <a:r>
+              <a:rPr lang="en-US" sz="650" dirty="0">
+                <a:solidFill>
+                  <a:srgbClr val="333333"/>
+                </a:solidFill>
+                <a:latin typeface="Tarsus" panose="02000000000000000000" pitchFamily="50" charset="0"/>
+                <a:cs typeface="Gill Sans MT"/>
+              </a:rPr>
+              <a:t>|</a:t>
+            </a:r>
+            <a:r>
+              <a:rPr lang="en-US" altLang="zh-TW" sz="650" dirty="0">
+                <a:solidFill>
+                  <a:srgbClr val="333333"/>
+                </a:solidFill>
+                <a:latin typeface="Tarsus" panose="02000000000000000000" pitchFamily="50" charset="0"/>
+                <a:cs typeface="Gill Sans MT"/>
+              </a:rPr>
+              <a:t> </a:t>
             </a:r>
             <a:r>
               <a:rPr lang="en-US" sz="650" spc="340" dirty="0">
@@ -2092,154 +2162,54 @@
               <a:t> </a:t>
             </a:r>
             <a:r>
-              <a:rPr lang="en-US" altLang="zh-TW" sz="650" spc="340" dirty="0">
+              <a:rPr lang="en-US" sz="650" spc="90" dirty="0">
+                <a:solidFill>
+                  <a:srgbClr val="333333"/>
+                </a:solidFill>
+                <a:latin typeface="Tarsus" panose="02000000000000000000" pitchFamily="50" charset="0"/>
+                <a:cs typeface="新細明體"/>
+              </a:rPr>
+              <a:t> </a:t>
+            </a:r>
+            <a:r>
+              <a:rPr lang="en-US" altLang="zh-TW" sz="650" spc="90" dirty="0">
+                <a:solidFill>
+                  <a:srgbClr val="333333"/>
+                </a:solidFill>
+                <a:latin typeface="Tarsus" panose="02000000000000000000" pitchFamily="50" charset="0"/>
+                <a:cs typeface="新細明體"/>
+              </a:rPr>
+              <a:t>  </a:t>
+            </a:r>
+            <a:r>
+              <a:rPr lang="en-US" sz="650" dirty="0">
                 <a:solidFill>
                   <a:srgbClr val="333333"/>
                 </a:solidFill>
                 <a:latin typeface="Tarsus" panose="02000000000000000000" pitchFamily="50" charset="0"/>
                 <a:cs typeface="Gill Sans MT"/>
               </a:rPr>
-              <a:t> </a:t>
-            </a:r>
-            <a:r>
-              <a:rPr lang="en-US" sz="650" spc="340" dirty="0">
+              <a:t>www.linkedin.com/in/chufei-</a:t>
+            </a:r>
+            <a:r>
+              <a:rPr lang="en-US" sz="650" spc="60" dirty="0">
                 <a:solidFill>
                   <a:srgbClr val="333333"/>
                 </a:solidFill>
                 <a:latin typeface="Tarsus" panose="02000000000000000000" pitchFamily="50" charset="0"/>
                 <a:cs typeface="Gill Sans MT"/>
               </a:rPr>
-              <a:t> </a:t>
-            </a:r>
-            <a:r>
-              <a:rPr lang="en-US" altLang="zh-TW" sz="650" spc="-80" dirty="0">
+              <a:t>wu-</a:t>
+            </a:r>
+            <a:r>
+              <a:rPr lang="en-US" sz="650" spc="55" dirty="0">
                 <a:solidFill>
                   <a:srgbClr val="333333"/>
                 </a:solidFill>
                 <a:latin typeface="Tarsus" panose="02000000000000000000" pitchFamily="50" charset="0"/>
                 <a:cs typeface="Gill Sans MT"/>
               </a:rPr>
-              <a:t> </a:t>
-            </a:r>
-            <a:r>
-              <a:rPr lang="en-US" sz="650" dirty="0">
-                <a:solidFill>
-                  <a:srgbClr val="333333"/>
-                </a:solidFill>
-                <a:latin typeface="Tarsus" panose="02000000000000000000" pitchFamily="50" charset="0"/>
-                <a:cs typeface="Gill Sans MT"/>
-              </a:rPr>
-              <a:t>DF-</a:t>
-            </a:r>
-            <a:r>
-              <a:rPr lang="en-US" sz="650" dirty="0" err="1">
-                <a:solidFill>
-                  <a:srgbClr val="333333"/>
-                </a:solidFill>
-                <a:latin typeface="Tarsus" panose="02000000000000000000" pitchFamily="50" charset="0"/>
-                <a:cs typeface="Gill Sans MT"/>
-              </a:rPr>
-              <a:t>wu</a:t>
-            </a:r>
-            <a:r>
-              <a:rPr lang="en-US" sz="650" spc="335" dirty="0">
-                <a:solidFill>
-                  <a:srgbClr val="333333"/>
-                </a:solidFill>
-                <a:latin typeface="Tarsus" panose="02000000000000000000" pitchFamily="50" charset="0"/>
-                <a:cs typeface="Gill Sans MT"/>
-              </a:rPr>
-              <a:t> </a:t>
-            </a:r>
-            <a:r>
-              <a:rPr lang="en-US" sz="650" dirty="0">
-                <a:solidFill>
-                  <a:srgbClr val="333333"/>
-                </a:solidFill>
-                <a:latin typeface="Tarsus" panose="02000000000000000000" pitchFamily="50" charset="0"/>
-                <a:cs typeface="Gill Sans MT"/>
-              </a:rPr>
-              <a:t>|</a:t>
-            </a:r>
-            <a:r>
-              <a:rPr lang="en-US" altLang="zh-TW" sz="650" dirty="0">
-                <a:solidFill>
-                  <a:srgbClr val="333333"/>
-                </a:solidFill>
-                <a:latin typeface="Tarsus" panose="02000000000000000000" pitchFamily="50" charset="0"/>
-                <a:cs typeface="Gill Sans MT"/>
-              </a:rPr>
-              <a:t>    </a:t>
-            </a:r>
-            <a:r>
-              <a:rPr lang="en-US" sz="650" spc="340" dirty="0">
-                <a:solidFill>
-                  <a:srgbClr val="333333"/>
-                </a:solidFill>
-                <a:latin typeface="Tarsus" panose="02000000000000000000" pitchFamily="50" charset="0"/>
-                <a:cs typeface="Gill Sans MT"/>
-              </a:rPr>
-              <a:t> </a:t>
-            </a:r>
-            <a:r>
-              <a:rPr lang="en-US" sz="650" spc="90" dirty="0">
-                <a:solidFill>
-                  <a:srgbClr val="333333"/>
-                </a:solidFill>
-                <a:latin typeface="Tarsus" panose="02000000000000000000" pitchFamily="50" charset="0"/>
-                <a:cs typeface="新細明體"/>
-              </a:rPr>
-              <a:t> </a:t>
-            </a:r>
-            <a:r>
-              <a:rPr lang="en-US" altLang="zh-TW" sz="650" spc="90" dirty="0">
-                <a:solidFill>
-                  <a:srgbClr val="333333"/>
-                </a:solidFill>
-                <a:latin typeface="Tarsus" panose="02000000000000000000" pitchFamily="50" charset="0"/>
-                <a:cs typeface="新細明體"/>
-              </a:rPr>
-              <a:t> </a:t>
-            </a:r>
-            <a:r>
-              <a:rPr lang="en-US" sz="650" dirty="0">
-                <a:solidFill>
-                  <a:srgbClr val="333333"/>
-                </a:solidFill>
-                <a:latin typeface="Tarsus" panose="02000000000000000000" pitchFamily="50" charset="0"/>
-                <a:cs typeface="Gill Sans MT"/>
-              </a:rPr>
-              <a:t>www.linkedin.com/in/chufei-</a:t>
-            </a:r>
-            <a:r>
-              <a:rPr lang="en-US" sz="650" spc="60" dirty="0">
-                <a:solidFill>
-                  <a:srgbClr val="333333"/>
-                </a:solidFill>
-                <a:latin typeface="Tarsus" panose="02000000000000000000" pitchFamily="50" charset="0"/>
-                <a:cs typeface="Gill Sans MT"/>
-              </a:rPr>
-              <a:t>wu-</a:t>
-            </a:r>
-            <a:r>
-              <a:rPr lang="en-US" sz="650" spc="55" dirty="0">
-                <a:solidFill>
-                  <a:srgbClr val="333333"/>
-                </a:solidFill>
-                <a:latin typeface="Tarsus" panose="02000000000000000000" pitchFamily="50" charset="0"/>
-                <a:cs typeface="Gill Sans MT"/>
-              </a:rPr>
               <a:t>b33990164/</a:t>
-            </a:r>
-            <a:r>
-              <a:rPr lang="en-US" sz="650" spc="340" dirty="0">
-                <a:solidFill>
-                  <a:srgbClr val="333333"/>
-                </a:solidFill>
-                <a:latin typeface="Tarsus" panose="02000000000000000000" pitchFamily="50" charset="0"/>
-                <a:cs typeface="Gill Sans MT"/>
-              </a:rPr>
-              <a:t>  </a:t>
             </a:r>
             <a:endParaRPr lang="en-US" sz="650" dirty="0">
               <a:latin typeface="Tarsus" panose="02000000000000000000" pitchFamily="50" charset="0"/>
@@ -4870,7 +4840,7 @@
         </p:blipFill>
         <p:spPr bwMode="auto">
           <a:xfrm>
-            <a:off x="2612594" y="691041"/>
+            <a:off x="2671232" y="687873"/>
             <a:ext cx="171425" cy="171425"/>
           </a:xfrm>
           <a:prstGeom prst="rect">
@@ -4910,7 +4880,7 @@
         </p:blipFill>
         <p:spPr>
           <a:xfrm>
-            <a:off x="3217041" y="720601"/>
+            <a:off x="3268374" y="722548"/>
             <a:ext cx="107686" cy="107686"/>
           </a:xfrm>
           <a:prstGeom prst="rect">
@@ -4940,7 +4910,7 @@
         </p:blipFill>
         <p:spPr>
           <a:xfrm>
-            <a:off x="1873250" y="721266"/>
+            <a:off x="1977259" y="721756"/>
             <a:ext cx="131677" cy="131677"/>
           </a:xfrm>
           <a:prstGeom prst="rect">

</xml_diff>

<commit_message>
print issue. slightly scale up the font.
</commit_message>
<xml_diff>
--- a/source/CHUFEIWU_Resume.pptx
+++ b/source/CHUFEIWU_Resume.pptx
@@ -2052,17 +2052,17 @@
               </a:spcBef>
             </a:pPr>
             <a:r>
-              <a:rPr lang="en-US" sz="650" dirty="0">
+              <a:rPr lang="en-US" sz="700" dirty="0">
                 <a:solidFill>
                   <a:srgbClr val="333333"/>
                 </a:solidFill>
                 <a:latin typeface="Tarsus" panose="02000000000000000000" pitchFamily="50" charset="0"/>
                 <a:cs typeface="Gill Sans MT"/>
               </a:rPr>
-              <a:t>        df@dfder.tw | </a:t>
-            </a:r>
-            <a:r>
-              <a:rPr lang="en-US" sz="650" spc="340" dirty="0">
+              <a:t>        df@dfder.tw  |</a:t>
+            </a:r>
+            <a:r>
+              <a:rPr lang="en-US" sz="700" spc="340" dirty="0">
                 <a:solidFill>
                   <a:srgbClr val="333333"/>
                 </a:solidFill>
@@ -2072,7 +2072,7 @@
               <a:t> </a:t>
             </a:r>
             <a:r>
-              <a:rPr lang="en-US" altLang="zh-TW" sz="650" spc="340" dirty="0">
+              <a:rPr lang="en-US" altLang="zh-TW" sz="700" spc="340" dirty="0">
                 <a:solidFill>
                   <a:srgbClr val="333333"/>
                 </a:solidFill>
@@ -2082,7 +2082,7 @@
               <a:t> </a:t>
             </a:r>
             <a:r>
-              <a:rPr lang="en-US" sz="650" spc="340" dirty="0">
+              <a:rPr lang="en-US" sz="700" spc="340" dirty="0">
                 <a:solidFill>
                   <a:srgbClr val="333333"/>
                 </a:solidFill>
@@ -2092,7 +2092,7 @@
               <a:t> </a:t>
             </a:r>
             <a:r>
-              <a:rPr lang="en-US" altLang="zh-TW" sz="650" spc="-80" dirty="0">
+              <a:rPr lang="en-US" altLang="zh-TW" sz="700" spc="-80" dirty="0">
                 <a:solidFill>
                   <a:srgbClr val="333333"/>
                 </a:solidFill>
@@ -2102,7 +2102,7 @@
               <a:t> </a:t>
             </a:r>
             <a:r>
-              <a:rPr lang="en-US" sz="650" dirty="0">
+              <a:rPr lang="en-US" sz="700" dirty="0">
                 <a:solidFill>
                   <a:srgbClr val="333333"/>
                 </a:solidFill>
@@ -2112,7 +2112,7 @@
               <a:t>DF-</a:t>
             </a:r>
             <a:r>
-              <a:rPr lang="en-US" sz="650" dirty="0" err="1">
+              <a:rPr lang="en-US" sz="700" dirty="0" err="1">
                 <a:solidFill>
                   <a:srgbClr val="333333"/>
                 </a:solidFill>
@@ -2122,7 +2122,7 @@
               <a:t>wu</a:t>
             </a:r>
             <a:r>
-              <a:rPr lang="en-US" sz="650" spc="335" dirty="0">
+              <a:rPr lang="en-US" sz="700" spc="335" dirty="0">
                 <a:solidFill>
                   <a:srgbClr val="333333"/>
                 </a:solidFill>
@@ -2132,7 +2132,7 @@
               <a:t> </a:t>
             </a:r>
             <a:r>
-              <a:rPr lang="en-US" sz="650" dirty="0">
+              <a:rPr lang="en-US" sz="700" dirty="0">
                 <a:solidFill>
                   <a:srgbClr val="333333"/>
                 </a:solidFill>
@@ -2142,7 +2142,7 @@
               <a:t>|</a:t>
             </a:r>
             <a:r>
-              <a:rPr lang="en-US" altLang="zh-TW" sz="650" dirty="0">
+              <a:rPr lang="en-US" altLang="zh-TW" sz="700" dirty="0">
                 <a:solidFill>
                   <a:srgbClr val="333333"/>
                 </a:solidFill>
@@ -2152,7 +2152,7 @@
               <a:t> </a:t>
             </a:r>
             <a:r>
-              <a:rPr lang="en-US" sz="650" spc="340" dirty="0">
+              <a:rPr lang="en-US" sz="700" spc="340" dirty="0">
                 <a:solidFill>
                   <a:srgbClr val="333333"/>
                 </a:solidFill>
@@ -2162,7 +2162,7 @@
               <a:t> </a:t>
             </a:r>
             <a:r>
-              <a:rPr lang="en-US" sz="650" spc="90" dirty="0">
+              <a:rPr lang="en-US" sz="700" spc="90" dirty="0">
                 <a:solidFill>
                   <a:srgbClr val="333333"/>
                 </a:solidFill>
@@ -2172,7 +2172,7 @@
               <a:t> </a:t>
             </a:r>
             <a:r>
-              <a:rPr lang="en-US" altLang="zh-TW" sz="650" spc="90" dirty="0">
+              <a:rPr lang="en-US" altLang="zh-TW" sz="700" spc="90" dirty="0">
                 <a:solidFill>
                   <a:srgbClr val="333333"/>
                 </a:solidFill>
@@ -2182,7 +2182,7 @@
               <a:t>  </a:t>
             </a:r>
             <a:r>
-              <a:rPr lang="en-US" sz="650" dirty="0">
+              <a:rPr lang="en-US" sz="700" dirty="0">
                 <a:solidFill>
                   <a:srgbClr val="333333"/>
                 </a:solidFill>
@@ -2192,7 +2192,7 @@
               <a:t>www.linkedin.com/in/chufei-</a:t>
             </a:r>
             <a:r>
-              <a:rPr lang="en-US" sz="650" spc="60" dirty="0">
+              <a:rPr lang="en-US" sz="700" spc="60" dirty="0">
                 <a:solidFill>
                   <a:srgbClr val="333333"/>
                 </a:solidFill>
@@ -2202,7 +2202,7 @@
               <a:t>wu-</a:t>
             </a:r>
             <a:r>
-              <a:rPr lang="en-US" sz="650" spc="55" dirty="0">
+              <a:rPr lang="en-US" sz="700" spc="55" dirty="0">
                 <a:solidFill>
                   <a:srgbClr val="333333"/>
                 </a:solidFill>
@@ -2211,7 +2211,7 @@
               </a:rPr>
               <a:t>b33990164/</a:t>
             </a:r>
-            <a:endParaRPr lang="en-US" sz="650" dirty="0">
+            <a:endParaRPr lang="en-US" sz="700" dirty="0">
               <a:latin typeface="Tarsus" panose="02000000000000000000" pitchFamily="50" charset="0"/>
               <a:cs typeface="Gill Sans MT"/>
             </a:endParaRPr>
@@ -4840,7 +4840,7 @@
         </p:blipFill>
         <p:spPr bwMode="auto">
           <a:xfrm>
-            <a:off x="2671232" y="687873"/>
+            <a:off x="2635250" y="688033"/>
             <a:ext cx="171425" cy="171425"/>
           </a:xfrm>
           <a:prstGeom prst="rect">
@@ -4880,8 +4880,8 @@
         </p:blipFill>
         <p:spPr>
           <a:xfrm>
-            <a:off x="3268374" y="722548"/>
-            <a:ext cx="107686" cy="107686"/>
+            <a:off x="3232657" y="718991"/>
+            <a:ext cx="117999" cy="117999"/>
           </a:xfrm>
           <a:prstGeom prst="rect">
             <a:avLst/>
@@ -4910,7 +4910,7 @@
         </p:blipFill>
         <p:spPr>
           <a:xfrm>
-            <a:off x="1977259" y="721756"/>
+            <a:off x="1873250" y="722147"/>
             <a:ext cx="131677" cy="131677"/>
           </a:xfrm>
           <a:prstGeom prst="rect">

</xml_diff>

<commit_message>
export PDF by powerpoint but not adobe acrobat
</commit_message>
<xml_diff>
--- a/source/CHUFEIWU_Resume.pptx
+++ b/source/CHUFEIWU_Resume.pptx
@@ -2209,7 +2209,7 @@
                 <a:latin typeface="Tarsus" panose="02000000000000000000" pitchFamily="50" charset="0"/>
                 <a:cs typeface="Gill Sans MT"/>
               </a:rPr>
-              <a:t>b33990164/</a:t>
+              <a:t>b33990164/  </a:t>
             </a:r>
             <a:endParaRPr lang="en-US" sz="700" dirty="0">
               <a:latin typeface="Tarsus" panose="02000000000000000000" pitchFamily="50" charset="0"/>
@@ -2226,7 +2226,7 @@
         </p:nvSpPr>
         <p:spPr>
           <a:xfrm>
-            <a:off x="467200" y="803102"/>
+            <a:off x="467355" y="877300"/>
             <a:ext cx="6597650" cy="268605"/>
           </a:xfrm>
           <a:prstGeom prst="rect">

</xml_diff>